<commit_message>
Site updated: 2024-01-15 23:11:06
</commit_message>
<xml_diff>
--- a/attaches/CV.pptx
+++ b/attaches/CV.pptx
@@ -104,6 +104,11 @@
       </a:defRPr>
     </a:lvl9pPr>
   </p:defaultTextStyle>
+  <p:extLst>
+    <p:ext uri="{EFAFB233-063F-42B5-8137-9DF3F51BA10A}">
+      <p15:sldGuideLst xmlns:p15="http://schemas.microsoft.com/office/powerpoint/2012/main"/>
+    </p:ext>
+  </p:extLst>
 </p:presentation>
 </file>
 
@@ -238,7 +243,7 @@
           <a:p>
             <a:fld id="{D9B27627-1ABF-4570-89B7-2F2CE923F251}" type="datetimeFigureOut">
               <a:rPr lang="zh-TW" altLang="en-US" smtClean="0"/>
-              <a:t>2024/1/13</a:t>
+              <a:t>2024/1/15</a:t>
             </a:fld>
             <a:endParaRPr lang="zh-TW" altLang="en-US"/>
           </a:p>
@@ -408,7 +413,7 @@
           <a:p>
             <a:fld id="{D9B27627-1ABF-4570-89B7-2F2CE923F251}" type="datetimeFigureOut">
               <a:rPr lang="zh-TW" altLang="en-US" smtClean="0"/>
-              <a:t>2024/1/13</a:t>
+              <a:t>2024/1/15</a:t>
             </a:fld>
             <a:endParaRPr lang="zh-TW" altLang="en-US"/>
           </a:p>
@@ -588,7 +593,7 @@
           <a:p>
             <a:fld id="{D9B27627-1ABF-4570-89B7-2F2CE923F251}" type="datetimeFigureOut">
               <a:rPr lang="zh-TW" altLang="en-US" smtClean="0"/>
-              <a:t>2024/1/13</a:t>
+              <a:t>2024/1/15</a:t>
             </a:fld>
             <a:endParaRPr lang="zh-TW" altLang="en-US"/>
           </a:p>
@@ -758,7 +763,7 @@
           <a:p>
             <a:fld id="{D9B27627-1ABF-4570-89B7-2F2CE923F251}" type="datetimeFigureOut">
               <a:rPr lang="zh-TW" altLang="en-US" smtClean="0"/>
-              <a:t>2024/1/13</a:t>
+              <a:t>2024/1/15</a:t>
             </a:fld>
             <a:endParaRPr lang="zh-TW" altLang="en-US"/>
           </a:p>
@@ -1002,7 +1007,7 @@
           <a:p>
             <a:fld id="{D9B27627-1ABF-4570-89B7-2F2CE923F251}" type="datetimeFigureOut">
               <a:rPr lang="zh-TW" altLang="en-US" smtClean="0"/>
-              <a:t>2024/1/13</a:t>
+              <a:t>2024/1/15</a:t>
             </a:fld>
             <a:endParaRPr lang="zh-TW" altLang="en-US"/>
           </a:p>
@@ -1234,7 +1239,7 @@
           <a:p>
             <a:fld id="{D9B27627-1ABF-4570-89B7-2F2CE923F251}" type="datetimeFigureOut">
               <a:rPr lang="zh-TW" altLang="en-US" smtClean="0"/>
-              <a:t>2024/1/13</a:t>
+              <a:t>2024/1/15</a:t>
             </a:fld>
             <a:endParaRPr lang="zh-TW" altLang="en-US"/>
           </a:p>
@@ -1601,7 +1606,7 @@
           <a:p>
             <a:fld id="{D9B27627-1ABF-4570-89B7-2F2CE923F251}" type="datetimeFigureOut">
               <a:rPr lang="zh-TW" altLang="en-US" smtClean="0"/>
-              <a:t>2024/1/13</a:t>
+              <a:t>2024/1/15</a:t>
             </a:fld>
             <a:endParaRPr lang="zh-TW" altLang="en-US"/>
           </a:p>
@@ -1719,7 +1724,7 @@
           <a:p>
             <a:fld id="{D9B27627-1ABF-4570-89B7-2F2CE923F251}" type="datetimeFigureOut">
               <a:rPr lang="zh-TW" altLang="en-US" smtClean="0"/>
-              <a:t>2024/1/13</a:t>
+              <a:t>2024/1/15</a:t>
             </a:fld>
             <a:endParaRPr lang="zh-TW" altLang="en-US"/>
           </a:p>
@@ -1814,7 +1819,7 @@
           <a:p>
             <a:fld id="{D9B27627-1ABF-4570-89B7-2F2CE923F251}" type="datetimeFigureOut">
               <a:rPr lang="zh-TW" altLang="en-US" smtClean="0"/>
-              <a:t>2024/1/13</a:t>
+              <a:t>2024/1/15</a:t>
             </a:fld>
             <a:endParaRPr lang="zh-TW" altLang="en-US"/>
           </a:p>
@@ -2091,7 +2096,7 @@
           <a:p>
             <a:fld id="{D9B27627-1ABF-4570-89B7-2F2CE923F251}" type="datetimeFigureOut">
               <a:rPr lang="zh-TW" altLang="en-US" smtClean="0"/>
-              <a:t>2024/1/13</a:t>
+              <a:t>2024/1/15</a:t>
             </a:fld>
             <a:endParaRPr lang="zh-TW" altLang="en-US"/>
           </a:p>
@@ -2348,7 +2353,7 @@
           <a:p>
             <a:fld id="{D9B27627-1ABF-4570-89B7-2F2CE923F251}" type="datetimeFigureOut">
               <a:rPr lang="zh-TW" altLang="en-US" smtClean="0"/>
-              <a:t>2024/1/13</a:t>
+              <a:t>2024/1/15</a:t>
             </a:fld>
             <a:endParaRPr lang="zh-TW" altLang="en-US"/>
           </a:p>
@@ -2561,7 +2566,7 @@
           <a:p>
             <a:fld id="{D9B27627-1ABF-4570-89B7-2F2CE923F251}" type="datetimeFigureOut">
               <a:rPr lang="zh-TW" altLang="en-US" smtClean="0"/>
-              <a:t>2024/1/13</a:t>
+              <a:t>2024/1/15</a:t>
             </a:fld>
             <a:endParaRPr lang="zh-TW" altLang="en-US"/>
           </a:p>
@@ -3451,9 +3456,9 @@
         <p:grpSpPr>
           <a:xfrm>
             <a:off x="287338" y="7124700"/>
-            <a:ext cx="2925762" cy="1586132"/>
+            <a:ext cx="2925762" cy="1955464"/>
             <a:chOff x="338138" y="2514600"/>
-            <a:chExt cx="2620962" cy="1586132"/>
+            <a:chExt cx="2620962" cy="1955464"/>
           </a:xfrm>
         </p:grpSpPr>
         <p:sp>
@@ -3537,7 +3542,7 @@
           <p:spPr>
             <a:xfrm>
               <a:off x="338138" y="3085069"/>
-              <a:ext cx="2620962" cy="1015663"/>
+              <a:ext cx="2620962" cy="1384995"/>
             </a:xfrm>
             <a:prstGeom prst="rect">
               <a:avLst/>
@@ -3559,6 +3564,21 @@
               </a:r>
             </a:p>
             <a:p>
+              <a:endParaRPr lang="en-US" altLang="zh-TW" sz="1200" dirty="0">
+                <a:latin typeface="+mj-lt"/>
+                <a:cs typeface="Arial" panose="020B0604020202020204" pitchFamily="34" charset="0"/>
+              </a:endParaRPr>
+            </a:p>
+            <a:p>
+              <a:r>
+                <a:rPr lang="en-US" altLang="zh-TW" sz="1200" dirty="0" smtClean="0">
+                  <a:latin typeface="+mj-lt"/>
+                  <a:cs typeface="Arial" panose="020B0604020202020204" pitchFamily="34" charset="0"/>
+                </a:rPr>
+                <a:t>C++</a:t>
+              </a:r>
+            </a:p>
+            <a:p>
               <a:endParaRPr lang="en-US" altLang="zh-TW" sz="1200" dirty="0" smtClean="0">
                 <a:latin typeface="+mj-lt"/>
                 <a:cs typeface="Arial" panose="020B0604020202020204" pitchFamily="34" charset="0"/>
@@ -3570,23 +3590,20 @@
                   <a:latin typeface="+mj-lt"/>
                   <a:cs typeface="Arial" panose="020B0604020202020204" pitchFamily="34" charset="0"/>
                 </a:rPr>
-                <a:t>C++</a:t>
+                <a:t>Python</a:t>
               </a:r>
             </a:p>
             <a:p>
-              <a:endParaRPr lang="en-US" altLang="zh-TW" sz="1200" dirty="0">
+              <a:endParaRPr lang="en-US" altLang="zh-TW" sz="1200" dirty="0" smtClean="0">
                 <a:latin typeface="+mj-lt"/>
                 <a:cs typeface="Arial" panose="020B0604020202020204" pitchFamily="34" charset="0"/>
               </a:endParaRPr>
             </a:p>
             <a:p>
-              <a:r>
-                <a:rPr lang="en-US" altLang="zh-TW" sz="1200" dirty="0" smtClean="0">
-                  <a:latin typeface="+mj-lt"/>
-                  <a:cs typeface="Arial" panose="020B0604020202020204" pitchFamily="34" charset="0"/>
-                </a:rPr>
-                <a:t>Python</a:t>
-              </a:r>
+              <a:endParaRPr lang="en-US" altLang="zh-TW" sz="1200" dirty="0" smtClean="0">
+                <a:latin typeface="+mj-lt"/>
+                <a:cs typeface="Arial" panose="020B0604020202020204" pitchFamily="34" charset="0"/>
+              </a:endParaRPr>
             </a:p>
           </p:txBody>
         </p:sp>
@@ -3599,10 +3616,10 @@
         </p:nvGrpSpPr>
         <p:grpSpPr>
           <a:xfrm>
-            <a:off x="2979067" y="2247900"/>
-            <a:ext cx="3542048" cy="2073445"/>
+            <a:off x="2979067" y="2117086"/>
+            <a:ext cx="3542048" cy="1888779"/>
             <a:chOff x="338138" y="2514600"/>
-            <a:chExt cx="3370262" cy="2073445"/>
+            <a:chExt cx="3370262" cy="1888779"/>
           </a:xfrm>
         </p:grpSpPr>
         <p:sp>
@@ -3686,7 +3703,7 @@
           <p:spPr>
             <a:xfrm>
               <a:off x="338138" y="3085069"/>
-              <a:ext cx="3370262" cy="1502976"/>
+              <a:ext cx="3370262" cy="1318310"/>
             </a:xfrm>
             <a:prstGeom prst="rect">
               <a:avLst/>
@@ -3804,7 +3821,13 @@
                 <a:rPr lang="en-US" altLang="zh-TW" sz="1200" dirty="0" smtClean="0">
                   <a:latin typeface="+mj-lt"/>
                 </a:rPr>
-                <a:t>issue more efficiently.</a:t>
+                <a:t>issues </a:t>
+              </a:r>
+              <a:r>
+                <a:rPr lang="en-US" altLang="zh-TW" sz="1200" dirty="0" smtClean="0">
+                  <a:latin typeface="+mj-lt"/>
+                </a:rPr>
+                <a:t>more efficiently.</a:t>
               </a:r>
               <a:endParaRPr lang="zh-TW" altLang="en-US" sz="1200" dirty="0">
                 <a:latin typeface="+mj-lt"/>
@@ -3822,10 +3845,10 @@
         </p:nvGrpSpPr>
         <p:grpSpPr>
           <a:xfrm>
-            <a:off x="2979066" y="4597979"/>
-            <a:ext cx="3586833" cy="2178602"/>
+            <a:off x="2979067" y="4241489"/>
+            <a:ext cx="3586833" cy="2732599"/>
             <a:chOff x="338138" y="2514600"/>
-            <a:chExt cx="3370262" cy="2178602"/>
+            <a:chExt cx="3370262" cy="2732599"/>
           </a:xfrm>
         </p:grpSpPr>
         <p:sp>
@@ -3909,7 +3932,7 @@
           <p:spPr>
             <a:xfrm>
               <a:off x="338138" y="3085069"/>
-              <a:ext cx="3370262" cy="1608133"/>
+              <a:ext cx="3370262" cy="2162130"/>
             </a:xfrm>
             <a:prstGeom prst="rect">
               <a:avLst/>
@@ -3979,7 +4002,7 @@
                   <a:latin typeface="+mj-lt"/>
                   <a:cs typeface="Arial" panose="020B0604020202020204" pitchFamily="34" charset="0"/>
                 </a:rPr>
-                <a:t>features</a:t>
+                <a:t>TCG Security features</a:t>
               </a:r>
             </a:p>
             <a:p>
@@ -3991,8 +4014,63 @@
                 <a:buChar char="-"/>
               </a:pPr>
               <a:r>
+                <a:rPr lang="en-US" altLang="zh-TW" sz="1200" dirty="0">
+                  <a:latin typeface="+mj-lt"/>
+                </a:rPr>
+                <a:t>Secure Boot Authentication</a:t>
+              </a:r>
+            </a:p>
+            <a:p>
+              <a:pPr marL="171450" indent="-171450">
+                <a:lnSpc>
+                  <a:spcPct val="150000"/>
+                </a:lnSpc>
+                <a:buFontTx/>
+                <a:buChar char="-"/>
+              </a:pPr>
+              <a:r>
+                <a:rPr lang="en-US" altLang="zh-TW" sz="1200" dirty="0">
+                  <a:latin typeface="+mj-lt"/>
+                </a:rPr>
+                <a:t>Firmware Update Verification</a:t>
+              </a:r>
+            </a:p>
+            <a:p>
+              <a:pPr marL="171450" indent="-171450">
+                <a:lnSpc>
+                  <a:spcPct val="150000"/>
+                </a:lnSpc>
+                <a:buFontTx/>
+                <a:buChar char="-"/>
+              </a:pPr>
+              <a:r>
+                <a:rPr lang="en-US" altLang="zh-TW" sz="1200" dirty="0">
+                  <a:latin typeface="+mj-lt"/>
+                </a:rPr>
+                <a:t>Threat Analysis and Risk </a:t>
+              </a:r>
+              <a:r>
                 <a:rPr lang="en-US" altLang="zh-TW" sz="1200" dirty="0" smtClean="0">
                   <a:latin typeface="+mj-lt"/>
+                </a:rPr>
+                <a:t>Assessment</a:t>
+              </a:r>
+              <a:endParaRPr lang="en-US" altLang="zh-TW" sz="1200" dirty="0" smtClean="0">
+                <a:latin typeface="+mj-lt"/>
+                <a:cs typeface="Arial" panose="020B0604020202020204" pitchFamily="34" charset="0"/>
+              </a:endParaRPr>
+            </a:p>
+            <a:p>
+              <a:pPr marL="171450" indent="-171450">
+                <a:lnSpc>
+                  <a:spcPct val="150000"/>
+                </a:lnSpc>
+                <a:buFontTx/>
+                <a:buChar char="-"/>
+              </a:pPr>
+              <a:r>
+                <a:rPr lang="en-US" altLang="zh-TW" sz="1200" dirty="0" smtClean="0">
+                  <a:latin typeface="+mj-lt"/>
                   <a:cs typeface="Arial" panose="020B0604020202020204" pitchFamily="34" charset="0"/>
                 </a:rPr>
                 <a:t>Modularize </a:t>
@@ -4002,14 +4080,14 @@
                   <a:latin typeface="+mj-lt"/>
                   <a:cs typeface="Arial" panose="020B0604020202020204" pitchFamily="34" charset="0"/>
                 </a:rPr>
-                <a:t>features into Libraries for easier project </a:t>
+                <a:t>features into </a:t>
               </a:r>
               <a:r>
                 <a:rPr lang="en-US" altLang="zh-TW" sz="1200" dirty="0" smtClean="0">
                   <a:latin typeface="+mj-lt"/>
                   <a:cs typeface="Arial" panose="020B0604020202020204" pitchFamily="34" charset="0"/>
                 </a:rPr>
-                <a:t>management</a:t>
+                <a:t>Libraries</a:t>
               </a:r>
             </a:p>
             <a:p>
@@ -4057,7 +4135,7 @@
         </p:nvGrpSpPr>
         <p:grpSpPr>
           <a:xfrm>
-            <a:off x="2979067" y="7022437"/>
+            <a:off x="2979067" y="7209713"/>
             <a:ext cx="3542048" cy="2591535"/>
             <a:chOff x="338138" y="2514600"/>
             <a:chExt cx="3370262" cy="2591535"/>

</xml_diff>

<commit_message>
Site updated: 2024-01-15 23:14:11
</commit_message>
<xml_diff>
--- a/attaches/CV.pptx
+++ b/attaches/CV.pptx
@@ -4364,11 +4364,20 @@
                 <a:buChar char="-"/>
               </a:pPr>
               <a:r>
+                <a:rPr lang="en-US" altLang="zh-TW" sz="1200" dirty="0">
+                  <a:latin typeface="+mj-lt"/>
+                </a:rPr>
+                <a:t>User Center Interaction </a:t>
+              </a:r>
+              <a:r>
                 <a:rPr lang="en-US" altLang="zh-TW" sz="1200" dirty="0" smtClean="0">
                   <a:latin typeface="+mj-lt"/>
                 </a:rPr>
-                <a:t>Arduino</a:t>
-              </a:r>
+                <a:t>Design</a:t>
+              </a:r>
+              <a:endParaRPr lang="en-US" altLang="zh-TW" sz="1200" dirty="0" smtClean="0">
+                <a:latin typeface="+mj-lt"/>
+              </a:endParaRPr>
             </a:p>
             <a:p>
               <a:pPr>

</xml_diff>

<commit_message>
Site updated: 2024-01-15 23:42:19
</commit_message>
<xml_diff>
--- a/attaches/CV.pptx
+++ b/attaches/CV.pptx
@@ -3564,7 +3564,7 @@
               </a:r>
             </a:p>
             <a:p>
-              <a:endParaRPr lang="en-US" altLang="zh-TW" sz="1200" dirty="0">
+              <a:endParaRPr lang="en-US" altLang="zh-TW" sz="1200" dirty="0" smtClean="0">
                 <a:latin typeface="+mj-lt"/>
                 <a:cs typeface="Arial" panose="020B0604020202020204" pitchFamily="34" charset="0"/>
               </a:endParaRPr>
@@ -3972,8 +3972,19 @@
                   <a:latin typeface="+mj-lt"/>
                   <a:cs typeface="Arial" panose="020B0604020202020204" pitchFamily="34" charset="0"/>
                 </a:rPr>
-                <a:t>Jan 2021 – Now</a:t>
-              </a:r>
+                <a:t>Jan 2021 – </a:t>
+              </a:r>
+              <a:r>
+                <a:rPr lang="en-US" altLang="zh-TW" sz="1200" dirty="0" smtClean="0">
+                  <a:latin typeface="+mj-lt"/>
+                  <a:cs typeface="Arial" panose="020B0604020202020204" pitchFamily="34" charset="0"/>
+                </a:rPr>
+                <a:t>Present</a:t>
+              </a:r>
+              <a:endParaRPr lang="en-US" altLang="zh-TW" sz="1200" dirty="0" smtClean="0">
+                <a:latin typeface="+mj-lt"/>
+                <a:cs typeface="Arial" panose="020B0604020202020204" pitchFamily="34" charset="0"/>
+              </a:endParaRPr>
             </a:p>
             <a:p>
               <a:pPr marL="171450" indent="-171450">
@@ -4370,14 +4381,11 @@
                 <a:t>User Center Interaction </a:t>
               </a:r>
               <a:r>
-                <a:rPr lang="en-US" altLang="zh-TW" sz="1200" dirty="0" smtClean="0">
+                <a:rPr lang="en-US" altLang="zh-TW" sz="1200" dirty="0">
                   <a:latin typeface="+mj-lt"/>
                 </a:rPr>
                 <a:t>Design</a:t>
               </a:r>
-              <a:endParaRPr lang="en-US" altLang="zh-TW" sz="1200" dirty="0" smtClean="0">
-                <a:latin typeface="+mj-lt"/>
-              </a:endParaRPr>
             </a:p>
             <a:p>
               <a:pPr>

</xml_diff>